<commit_message>
Add QA Documentation close #37
* Change some comments
</commit_message>
<xml_diff>
--- a/doc/Presentation.pptx
+++ b/doc/Presentation.pptx
@@ -273,6 +273,11 @@
       </a:defRPr>
     </a:lvl9pPr>
   </p:defaultTextStyle>
+  <p:extLst>
+    <p:ext uri="{EFAFB233-063F-42B5-8137-9DF3F51BA10A}">
+      <p15:sldGuideLst xmlns:p15="http://schemas.microsoft.com/office/powerpoint/2012/main"/>
+    </p:ext>
+  </p:extLst>
 </p:presentation>
 </file>
 
@@ -7953,13 +7958,13 @@
   <p:clrMapOvr>
     <a:masterClrMapping/>
   </p:clrMapOvr>
-  <mc:AlternateContent xmlns:mc="http://schemas.openxmlformats.org/markup-compatibility/2006">
-    <mc:Choice xmlns:p159="http://schemas.microsoft.com/office/powerpoint/2015/09/main" Requires="p159">
+  <mc:AlternateContent xmlns:mc="http://schemas.openxmlformats.org/markup-compatibility/2006" xmlns:p159="http://schemas.microsoft.com/office/powerpoint/2015/09/main">
+    <mc:Choice Requires="p159">
       <p:transition xmlns:p14="http://schemas.microsoft.com/office/powerpoint/2010/main" spd="slow" p14:dur="2000">
         <p159:morph option="byObject"/>
       </p:transition>
     </mc:Choice>
-    <mc:Fallback>
+    <mc:Fallback xmlns="">
       <p:transition spd="slow">
         <p:fade/>
       </p:transition>
@@ -7997,7 +8002,7 @@
         </p:nvSpPr>
         <p:spPr>
           <a:xfrm>
-            <a:off x="1964850" y="788279"/>
+            <a:off x="1832635" y="681077"/>
             <a:ext cx="5214300" cy="946200"/>
           </a:xfrm>
           <a:prstGeom prst="rect">
@@ -8022,6 +8027,10 @@
             <a:r>
               <a:rPr lang="en" dirty="0"/>
               <a:t>STAGES OF WORK</a:t>
+            </a:r>
+            <a:r>
+              <a:rPr lang="en-GB" dirty="0"/>
+              <a:t>ING OUT</a:t>
             </a:r>
             <a:endParaRPr dirty="0"/>
           </a:p>
@@ -11490,13 +11499,13 @@
   <p:clrMapOvr>
     <a:masterClrMapping/>
   </p:clrMapOvr>
-  <mc:AlternateContent xmlns:mc="http://schemas.openxmlformats.org/markup-compatibility/2006">
-    <mc:Choice xmlns:p159="http://schemas.microsoft.com/office/powerpoint/2015/09/main" Requires="p159">
+  <mc:AlternateContent xmlns:mc="http://schemas.openxmlformats.org/markup-compatibility/2006" xmlns:p159="http://schemas.microsoft.com/office/powerpoint/2015/09/main">
+    <mc:Choice Requires="p159">
       <p:transition xmlns:p14="http://schemas.microsoft.com/office/powerpoint/2010/main" spd="slow" p14:dur="2000">
         <p159:morph option="byObject"/>
       </p:transition>
     </mc:Choice>
-    <mc:Fallback>
+    <mc:Fallback xmlns="">
       <p:transition spd="slow">
         <p:fade/>
       </p:transition>
@@ -12283,485 +12292,6 @@
   <p:transition spd="slow">
     <p:wipe/>
   </p:transition>
-  <p:timing>
-    <p:tnLst>
-      <p:par>
-        <p:cTn id="1" dur="indefinite" restart="never" nodeType="tmRoot">
-          <p:childTnLst>
-            <p:seq concurrent="1" nextAc="seek">
-              <p:cTn id="2" dur="indefinite" nodeType="mainSeq">
-                <p:childTnLst>
-                  <p:par>
-                    <p:cTn id="3" fill="hold">
-                      <p:stCondLst>
-                        <p:cond delay="indefinite"/>
-                        <p:cond evt="onBegin" delay="0">
-                          <p:tn val="2"/>
-                        </p:cond>
-                      </p:stCondLst>
-                      <p:childTnLst>
-                        <p:par>
-                          <p:cTn id="4" fill="hold">
-                            <p:stCondLst>
-                              <p:cond delay="0"/>
-                            </p:stCondLst>
-                            <p:childTnLst>
-                              <p:par>
-                                <p:cTn id="5" presetID="1" presetClass="exit" presetSubtype="0" fill="hold" nodeType="withEffect">
-                                  <p:stCondLst>
-                                    <p:cond delay="0"/>
-                                  </p:stCondLst>
-                                  <p:childTnLst>
-                                    <p:set>
-                                      <p:cBhvr>
-                                        <p:cTn id="6" dur="1" fill="hold">
-                                          <p:stCondLst>
-                                            <p:cond delay="0"/>
-                                          </p:stCondLst>
-                                        </p:cTn>
-                                        <p:tgtEl>
-                                          <p:spTgt spid="8"/>
-                                        </p:tgtEl>
-                                        <p:attrNameLst>
-                                          <p:attrName>style.visibility</p:attrName>
-                                        </p:attrNameLst>
-                                      </p:cBhvr>
-                                      <p:to>
-                                        <p:strVal val="hidden"/>
-                                      </p:to>
-                                    </p:set>
-                                  </p:childTnLst>
-                                </p:cTn>
-                              </p:par>
-                              <p:par>
-                                <p:cTn id="7" presetID="1" presetClass="exit" presetSubtype="0" fill="hold" nodeType="withEffect">
-                                  <p:stCondLst>
-                                    <p:cond delay="0"/>
-                                  </p:stCondLst>
-                                  <p:childTnLst>
-                                    <p:set>
-                                      <p:cBhvr>
-                                        <p:cTn id="8" dur="1" fill="hold">
-                                          <p:stCondLst>
-                                            <p:cond delay="0"/>
-                                          </p:stCondLst>
-                                        </p:cTn>
-                                        <p:tgtEl>
-                                          <p:spTgt spid="11"/>
-                                        </p:tgtEl>
-                                        <p:attrNameLst>
-                                          <p:attrName>style.visibility</p:attrName>
-                                        </p:attrNameLst>
-                                      </p:cBhvr>
-                                      <p:to>
-                                        <p:strVal val="hidden"/>
-                                      </p:to>
-                                    </p:set>
-                                  </p:childTnLst>
-                                </p:cTn>
-                              </p:par>
-                              <p:par>
-                                <p:cTn id="9" presetID="1" presetClass="exit" presetSubtype="0" fill="hold" nodeType="withEffect">
-                                  <p:stCondLst>
-                                    <p:cond delay="0"/>
-                                  </p:stCondLst>
-                                  <p:childTnLst>
-                                    <p:set>
-                                      <p:cBhvr>
-                                        <p:cTn id="10" dur="1" fill="hold">
-                                          <p:stCondLst>
-                                            <p:cond delay="0"/>
-                                          </p:stCondLst>
-                                        </p:cTn>
-                                        <p:tgtEl>
-                                          <p:spTgt spid="14"/>
-                                        </p:tgtEl>
-                                        <p:attrNameLst>
-                                          <p:attrName>style.visibility</p:attrName>
-                                        </p:attrNameLst>
-                                      </p:cBhvr>
-                                      <p:to>
-                                        <p:strVal val="hidden"/>
-                                      </p:to>
-                                    </p:set>
-                                  </p:childTnLst>
-                                </p:cTn>
-                              </p:par>
-                              <p:par>
-                                <p:cTn id="11" presetID="1" presetClass="exit" presetSubtype="0" fill="hold" nodeType="withEffect">
-                                  <p:stCondLst>
-                                    <p:cond delay="0"/>
-                                  </p:stCondLst>
-                                  <p:childTnLst>
-                                    <p:set>
-                                      <p:cBhvr>
-                                        <p:cTn id="12" dur="1" fill="hold">
-                                          <p:stCondLst>
-                                            <p:cond delay="0"/>
-                                          </p:stCondLst>
-                                        </p:cTn>
-                                        <p:tgtEl>
-                                          <p:spTgt spid="5"/>
-                                        </p:tgtEl>
-                                        <p:attrNameLst>
-                                          <p:attrName>style.visibility</p:attrName>
-                                        </p:attrNameLst>
-                                      </p:cBhvr>
-                                      <p:to>
-                                        <p:strVal val="hidden"/>
-                                      </p:to>
-                                    </p:set>
-                                  </p:childTnLst>
-                                </p:cTn>
-                              </p:par>
-                            </p:childTnLst>
-                          </p:cTn>
-                        </p:par>
-                      </p:childTnLst>
-                    </p:cTn>
-                  </p:par>
-                  <p:par>
-                    <p:cTn id="13" fill="hold">
-                      <p:stCondLst>
-                        <p:cond delay="indefinite"/>
-                      </p:stCondLst>
-                      <p:childTnLst>
-                        <p:par>
-                          <p:cTn id="14" fill="hold">
-                            <p:stCondLst>
-                              <p:cond delay="0"/>
-                            </p:stCondLst>
-                            <p:childTnLst>
-                              <p:par>
-                                <p:cTn id="15" presetID="10" presetClass="entr" presetSubtype="0" fill="hold" nodeType="clickEffect">
-                                  <p:stCondLst>
-                                    <p:cond delay="0"/>
-                                  </p:stCondLst>
-                                  <p:childTnLst>
-                                    <p:set>
-                                      <p:cBhvr>
-                                        <p:cTn id="16" dur="1" fill="hold">
-                                          <p:stCondLst>
-                                            <p:cond delay="0"/>
-                                          </p:stCondLst>
-                                        </p:cTn>
-                                        <p:tgtEl>
-                                          <p:spTgt spid="8"/>
-                                        </p:tgtEl>
-                                        <p:attrNameLst>
-                                          <p:attrName>style.visibility</p:attrName>
-                                        </p:attrNameLst>
-                                      </p:cBhvr>
-                                      <p:to>
-                                        <p:strVal val="visible"/>
-                                      </p:to>
-                                    </p:set>
-                                    <p:animEffect transition="in" filter="fade">
-                                      <p:cBhvr>
-                                        <p:cTn id="17" dur="500"/>
-                                        <p:tgtEl>
-                                          <p:spTgt spid="8"/>
-                                        </p:tgtEl>
-                                      </p:cBhvr>
-                                    </p:animEffect>
-                                  </p:childTnLst>
-                                </p:cTn>
-                              </p:par>
-                            </p:childTnLst>
-                          </p:cTn>
-                        </p:par>
-                      </p:childTnLst>
-                    </p:cTn>
-                  </p:par>
-                  <p:par>
-                    <p:cTn id="18" fill="hold">
-                      <p:stCondLst>
-                        <p:cond delay="indefinite"/>
-                      </p:stCondLst>
-                      <p:childTnLst>
-                        <p:par>
-                          <p:cTn id="19" fill="hold">
-                            <p:stCondLst>
-                              <p:cond delay="0"/>
-                            </p:stCondLst>
-                            <p:childTnLst>
-                              <p:par>
-                                <p:cTn id="20" presetID="10" presetClass="entr" presetSubtype="0" fill="hold" nodeType="clickEffect">
-                                  <p:stCondLst>
-                                    <p:cond delay="0"/>
-                                  </p:stCondLst>
-                                  <p:childTnLst>
-                                    <p:set>
-                                      <p:cBhvr>
-                                        <p:cTn id="21" dur="1" fill="hold">
-                                          <p:stCondLst>
-                                            <p:cond delay="0"/>
-                                          </p:stCondLst>
-                                        </p:cTn>
-                                        <p:tgtEl>
-                                          <p:spTgt spid="11"/>
-                                        </p:tgtEl>
-                                        <p:attrNameLst>
-                                          <p:attrName>style.visibility</p:attrName>
-                                        </p:attrNameLst>
-                                      </p:cBhvr>
-                                      <p:to>
-                                        <p:strVal val="visible"/>
-                                      </p:to>
-                                    </p:set>
-                                    <p:animEffect transition="in" filter="fade">
-                                      <p:cBhvr>
-                                        <p:cTn id="22" dur="500"/>
-                                        <p:tgtEl>
-                                          <p:spTgt spid="11"/>
-                                        </p:tgtEl>
-                                      </p:cBhvr>
-                                    </p:animEffect>
-                                  </p:childTnLst>
-                                </p:cTn>
-                              </p:par>
-                            </p:childTnLst>
-                          </p:cTn>
-                        </p:par>
-                      </p:childTnLst>
-                    </p:cTn>
-                  </p:par>
-                  <p:par>
-                    <p:cTn id="23" fill="hold">
-                      <p:stCondLst>
-                        <p:cond delay="indefinite"/>
-                      </p:stCondLst>
-                      <p:childTnLst>
-                        <p:par>
-                          <p:cTn id="24" fill="hold">
-                            <p:stCondLst>
-                              <p:cond delay="0"/>
-                            </p:stCondLst>
-                            <p:childTnLst>
-                              <p:par>
-                                <p:cTn id="25" presetID="10" presetClass="entr" presetSubtype="0" fill="hold" nodeType="clickEffect">
-                                  <p:stCondLst>
-                                    <p:cond delay="0"/>
-                                  </p:stCondLst>
-                                  <p:childTnLst>
-                                    <p:set>
-                                      <p:cBhvr>
-                                        <p:cTn id="26" dur="1" fill="hold">
-                                          <p:stCondLst>
-                                            <p:cond delay="0"/>
-                                          </p:stCondLst>
-                                        </p:cTn>
-                                        <p:tgtEl>
-                                          <p:spTgt spid="14"/>
-                                        </p:tgtEl>
-                                        <p:attrNameLst>
-                                          <p:attrName>style.visibility</p:attrName>
-                                        </p:attrNameLst>
-                                      </p:cBhvr>
-                                      <p:to>
-                                        <p:strVal val="visible"/>
-                                      </p:to>
-                                    </p:set>
-                                    <p:animEffect transition="in" filter="fade">
-                                      <p:cBhvr>
-                                        <p:cTn id="27" dur="500"/>
-                                        <p:tgtEl>
-                                          <p:spTgt spid="14"/>
-                                        </p:tgtEl>
-                                      </p:cBhvr>
-                                    </p:animEffect>
-                                  </p:childTnLst>
-                                </p:cTn>
-                              </p:par>
-                            </p:childTnLst>
-                          </p:cTn>
-                        </p:par>
-                      </p:childTnLst>
-                    </p:cTn>
-                  </p:par>
-                  <p:par>
-                    <p:cTn id="28" fill="hold">
-                      <p:stCondLst>
-                        <p:cond delay="indefinite"/>
-                      </p:stCondLst>
-                      <p:childTnLst>
-                        <p:par>
-                          <p:cTn id="29" fill="hold">
-                            <p:stCondLst>
-                              <p:cond delay="0"/>
-                            </p:stCondLst>
-                            <p:childTnLst>
-                              <p:par>
-                                <p:cTn id="30" presetID="10" presetClass="entr" presetSubtype="0" fill="hold" nodeType="clickEffect">
-                                  <p:stCondLst>
-                                    <p:cond delay="0"/>
-                                  </p:stCondLst>
-                                  <p:childTnLst>
-                                    <p:set>
-                                      <p:cBhvr>
-                                        <p:cTn id="31" dur="1" fill="hold">
-                                          <p:stCondLst>
-                                            <p:cond delay="0"/>
-                                          </p:stCondLst>
-                                        </p:cTn>
-                                        <p:tgtEl>
-                                          <p:spTgt spid="5"/>
-                                        </p:tgtEl>
-                                        <p:attrNameLst>
-                                          <p:attrName>style.visibility</p:attrName>
-                                        </p:attrNameLst>
-                                      </p:cBhvr>
-                                      <p:to>
-                                        <p:strVal val="visible"/>
-                                      </p:to>
-                                    </p:set>
-                                    <p:animEffect transition="in" filter="fade">
-                                      <p:cBhvr>
-                                        <p:cTn id="32" dur="500"/>
-                                        <p:tgtEl>
-                                          <p:spTgt spid="5"/>
-                                        </p:tgtEl>
-                                      </p:cBhvr>
-                                    </p:animEffect>
-                                  </p:childTnLst>
-                                </p:cTn>
-                              </p:par>
-                              <p:par>
-                                <p:cTn id="33" presetID="1" presetClass="exit" presetSubtype="0" fill="hold" nodeType="withEffect">
-                                  <p:stCondLst>
-                                    <p:cond delay="0"/>
-                                  </p:stCondLst>
-                                  <p:childTnLst>
-                                    <p:set>
-                                      <p:cBhvr>
-                                        <p:cTn id="34" dur="1" fill="hold">
-                                          <p:stCondLst>
-                                            <p:cond delay="0"/>
-                                          </p:stCondLst>
-                                        </p:cTn>
-                                        <p:tgtEl>
-                                          <p:spTgt spid="8"/>
-                                        </p:tgtEl>
-                                        <p:attrNameLst>
-                                          <p:attrName>style.visibility</p:attrName>
-                                        </p:attrNameLst>
-                                      </p:cBhvr>
-                                      <p:to>
-                                        <p:strVal val="hidden"/>
-                                      </p:to>
-                                    </p:set>
-                                  </p:childTnLst>
-                                </p:cTn>
-                              </p:par>
-                              <p:par>
-                                <p:cTn id="35" presetID="1" presetClass="exit" presetSubtype="0" fill="hold" nodeType="withEffect">
-                                  <p:stCondLst>
-                                    <p:cond delay="0"/>
-                                  </p:stCondLst>
-                                  <p:childTnLst>
-                                    <p:set>
-                                      <p:cBhvr>
-                                        <p:cTn id="36" dur="1" fill="hold">
-                                          <p:stCondLst>
-                                            <p:cond delay="0"/>
-                                          </p:stCondLst>
-                                        </p:cTn>
-                                        <p:tgtEl>
-                                          <p:spTgt spid="11"/>
-                                        </p:tgtEl>
-                                        <p:attrNameLst>
-                                          <p:attrName>style.visibility</p:attrName>
-                                        </p:attrNameLst>
-                                      </p:cBhvr>
-                                      <p:to>
-                                        <p:strVal val="hidden"/>
-                                      </p:to>
-                                    </p:set>
-                                  </p:childTnLst>
-                                </p:cTn>
-                              </p:par>
-                              <p:par>
-                                <p:cTn id="37" presetID="1" presetClass="exit" presetSubtype="0" fill="hold" nodeType="withEffect">
-                                  <p:stCondLst>
-                                    <p:cond delay="0"/>
-                                  </p:stCondLst>
-                                  <p:childTnLst>
-                                    <p:set>
-                                      <p:cBhvr>
-                                        <p:cTn id="38" dur="1" fill="hold">
-                                          <p:stCondLst>
-                                            <p:cond delay="0"/>
-                                          </p:stCondLst>
-                                        </p:cTn>
-                                        <p:tgtEl>
-                                          <p:spTgt spid="14"/>
-                                        </p:tgtEl>
-                                        <p:attrNameLst>
-                                          <p:attrName>style.visibility</p:attrName>
-                                        </p:attrNameLst>
-                                      </p:cBhvr>
-                                      <p:to>
-                                        <p:strVal val="hidden"/>
-                                      </p:to>
-                                    </p:set>
-                                  </p:childTnLst>
-                                </p:cTn>
-                              </p:par>
-                              <p:par>
-                                <p:cTn id="39" presetID="1" presetClass="exit" presetSubtype="0" fill="hold" nodeType="withEffect">
-                                  <p:stCondLst>
-                                    <p:cond delay="0"/>
-                                  </p:stCondLst>
-                                  <p:childTnLst>
-                                    <p:set>
-                                      <p:cBhvr>
-                                        <p:cTn id="40" dur="1" fill="hold">
-                                          <p:stCondLst>
-                                            <p:cond delay="0"/>
-                                          </p:stCondLst>
-                                        </p:cTn>
-                                        <p:tgtEl>
-                                          <p:spTgt spid="5"/>
-                                        </p:tgtEl>
-                                        <p:attrNameLst>
-                                          <p:attrName>style.visibility</p:attrName>
-                                        </p:attrNameLst>
-                                      </p:cBhvr>
-                                      <p:to>
-                                        <p:strVal val="hidden"/>
-                                      </p:to>
-                                    </p:set>
-                                  </p:childTnLst>
-                                </p:cTn>
-                              </p:par>
-                            </p:childTnLst>
-                          </p:cTn>
-                        </p:par>
-                      </p:childTnLst>
-                    </p:cTn>
-                  </p:par>
-                </p:childTnLst>
-              </p:cTn>
-              <p:prevCondLst>
-                <p:cond evt="onPrev" delay="0">
-                  <p:tgtEl>
-                    <p:sldTgt/>
-                  </p:tgtEl>
-                </p:cond>
-              </p:prevCondLst>
-              <p:nextCondLst>
-                <p:cond evt="onNext" delay="0">
-                  <p:tgtEl>
-                    <p:sldTgt/>
-                  </p:tgtEl>
-                </p:cond>
-              </p:nextCondLst>
-            </p:seq>
-          </p:childTnLst>
-        </p:cTn>
-      </p:par>
-    </p:tnLst>
-  </p:timing>
 </p:sld>
 </file>
 
@@ -12889,13 +12419,13 @@
   <p:clrMapOvr>
     <a:masterClrMapping/>
   </p:clrMapOvr>
-  <mc:AlternateContent xmlns:mc="http://schemas.openxmlformats.org/markup-compatibility/2006">
-    <mc:Choice xmlns:p14="http://schemas.microsoft.com/office/powerpoint/2010/main" Requires="p14">
+  <mc:AlternateContent xmlns:mc="http://schemas.openxmlformats.org/markup-compatibility/2006" xmlns:p14="http://schemas.microsoft.com/office/powerpoint/2010/main">
+    <mc:Choice Requires="p14">
       <p:transition spd="slow" p14:dur="3400">
         <p14:reveal/>
       </p:transition>
     </mc:Choice>
-    <mc:Fallback>
+    <mc:Fallback xmlns="">
       <p:transition spd="slow">
         <p:fade/>
       </p:transition>
@@ -12907,7 +12437,7 @@
 <file path=ppt/theme/theme1.xml><?xml version="1.0" encoding="utf-8"?>
 <a:theme xmlns:a="http://schemas.openxmlformats.org/drawingml/2006/main" name="Tech Newsletter by Slidesgo">
   <a:themeElements>
-    <a:clrScheme name="Simple Light">
+    <a:clrScheme name="Custom 36">
       <a:dk1>
         <a:srgbClr val="AAFFEE"/>
       </a:dk1>

</xml_diff>